<commit_message>
added updated pptx and code
</commit_message>
<xml_diff>
--- a/Sepsis Cases – Event Log.pptx
+++ b/Sepsis Cases – Event Log.pptx
@@ -5,10 +5,10 @@
     <p:sldMasterId id="2147483746" r:id="rId1"/>
   </p:sldMasterIdLst>
   <p:notesMasterIdLst>
-    <p:notesMasterId r:id="rId14"/>
+    <p:notesMasterId r:id="rId17"/>
   </p:notesMasterIdLst>
   <p:handoutMasterIdLst>
-    <p:handoutMasterId r:id="rId15"/>
+    <p:handoutMasterId r:id="rId18"/>
   </p:handoutMasterIdLst>
   <p:sldIdLst>
     <p:sldId id="257" r:id="rId2"/>
@@ -23,6 +23,9 @@
     <p:sldId id="281" r:id="rId11"/>
     <p:sldId id="278" r:id="rId12"/>
     <p:sldId id="282" r:id="rId13"/>
+    <p:sldId id="284" r:id="rId14"/>
+    <p:sldId id="283" r:id="rId15"/>
+    <p:sldId id="285" r:id="rId16"/>
   </p:sldIdLst>
   <p:sldSz cx="12192000" cy="6858000"/>
   <p:notesSz cx="6858000" cy="9144000"/>
@@ -216,7 +219,7 @@
             <a:pPr algn="l" rtl="1"/>
             <a:fld id="{6AF7FF25-121C-4B35-9136-601995D9EB78}" type="datetime1">
               <a:rPr lang="he-IL" smtClean="0"/>
-              <a:t>כ"ו/סיון/תשפ"ד</a:t>
+              <a:t>א'/תמוז/תשפ"ד</a:t>
             </a:fld>
             <a:endParaRPr lang="en-US" dirty="0"/>
           </a:p>
@@ -387,7 +390,7 @@
             <a:pPr rtl="1"/>
             <a:fld id="{A740E3E4-E9D9-49FD-9F18-2E96717D35D6}" type="datetime1">
               <a:rPr lang="he-IL" smtClean="0"/>
-              <a:t>כ"ו/סיון/תשפ"ד</a:t>
+              <a:t>א'/תמוז/תשפ"ד</a:t>
             </a:fld>
             <a:endParaRPr lang="en-US"/>
           </a:p>
@@ -872,7 +875,7 @@
             <a:pPr rtl="1"/>
             <a:fld id="{A740E3E4-E9D9-49FD-9F18-2E96717D35D6}" type="datetime1">
               <a:rPr lang="he-IL" smtClean="0"/>
-              <a:t>כ"ו/סיון/תשפ"ד</a:t>
+              <a:t>א'/תמוז/תשפ"ד</a:t>
             </a:fld>
             <a:endParaRPr lang="en-US"/>
           </a:p>
@@ -989,7 +992,7 @@
             <a:pPr rtl="1"/>
             <a:fld id="{A740E3E4-E9D9-49FD-9F18-2E96717D35D6}" type="datetime1">
               <a:rPr lang="he-IL" smtClean="0"/>
-              <a:t>כ"ו/סיון/תשפ"ד</a:t>
+              <a:t>א'/תמוז/תשפ"ד</a:t>
             </a:fld>
             <a:endParaRPr lang="en-US"/>
           </a:p>
@@ -1024,6 +1027,357 @@
     <p:extLst>
       <p:ext uri="{BB962C8B-B14F-4D97-AF65-F5344CB8AC3E}">
         <p14:creationId xmlns:p14="http://schemas.microsoft.com/office/powerpoint/2010/main" val="2471341442"/>
+      </p:ext>
+    </p:extLst>
+  </p:cSld>
+  <p:clrMapOvr>
+    <a:masterClrMapping/>
+  </p:clrMapOvr>
+</p:notes>
+</file>
+
+<file path=ppt/notesSlides/notesSlide11.xml><?xml version="1.0" encoding="utf-8"?>
+<p:notes xmlns:a="http://schemas.openxmlformats.org/drawingml/2006/main" xmlns:r="http://schemas.openxmlformats.org/officeDocument/2006/relationships" xmlns:p="http://schemas.openxmlformats.org/presentationml/2006/main">
+  <p:cSld>
+    <p:spTree>
+      <p:nvGrpSpPr>
+        <p:cNvPr id="1" name=""/>
+        <p:cNvGrpSpPr/>
+        <p:nvPr/>
+      </p:nvGrpSpPr>
+      <p:grpSpPr>
+        <a:xfrm>
+          <a:off x="0" y="0"/>
+          <a:ext cx="0" cy="0"/>
+          <a:chOff x="0" y="0"/>
+          <a:chExt cx="0" cy="0"/>
+        </a:xfrm>
+      </p:grpSpPr>
+      <p:sp>
+        <p:nvSpPr>
+          <p:cNvPr id="2" name="מציין מיקום של תמונת שקופית 1"/>
+          <p:cNvSpPr>
+            <a:spLocks noGrp="1" noRot="1" noChangeAspect="1"/>
+          </p:cNvSpPr>
+          <p:nvPr>
+            <p:ph type="sldImg"/>
+          </p:nvPr>
+        </p:nvSpPr>
+        <p:spPr/>
+      </p:sp>
+      <p:sp>
+        <p:nvSpPr>
+          <p:cNvPr id="3" name="מציין מיקום של הערות 2"/>
+          <p:cNvSpPr>
+            <a:spLocks noGrp="1"/>
+          </p:cNvSpPr>
+          <p:nvPr>
+            <p:ph type="body" idx="1"/>
+          </p:nvPr>
+        </p:nvSpPr>
+        <p:spPr/>
+        <p:txBody>
+          <a:bodyPr/>
+          <a:lstStyle/>
+          <a:p>
+            <a:pPr marL="285750" indent="-285750" algn="l" rtl="0">
+              <a:buFont typeface="Arial" panose="020B0604020202020204" pitchFamily="34" charset="0"/>
+              <a:buChar char="•"/>
+            </a:pPr>
+            <a:r>
+              <a:rPr lang="en-US" sz="1200" dirty="0"/>
+              <a:t>Compared results across different trace counts</a:t>
+            </a:r>
+          </a:p>
+        </p:txBody>
+      </p:sp>
+      <p:sp>
+        <p:nvSpPr>
+          <p:cNvPr id="4" name="מציין מיקום של תאריך 3"/>
+          <p:cNvSpPr>
+            <a:spLocks noGrp="1"/>
+          </p:cNvSpPr>
+          <p:nvPr>
+            <p:ph type="dt" idx="1"/>
+          </p:nvPr>
+        </p:nvSpPr>
+        <p:spPr/>
+        <p:txBody>
+          <a:bodyPr/>
+          <a:lstStyle/>
+          <a:p>
+            <a:pPr rtl="1"/>
+            <a:fld id="{A740E3E4-E9D9-49FD-9F18-2E96717D35D6}" type="datetime1">
+              <a:rPr lang="he-IL" smtClean="0"/>
+              <a:t>א'/תמוז/תשפ"ד</a:t>
+            </a:fld>
+            <a:endParaRPr lang="en-US"/>
+          </a:p>
+        </p:txBody>
+      </p:sp>
+      <p:sp>
+        <p:nvSpPr>
+          <p:cNvPr id="5" name="מציין מיקום של מספר שקופית 4"/>
+          <p:cNvSpPr>
+            <a:spLocks noGrp="1"/>
+          </p:cNvSpPr>
+          <p:nvPr>
+            <p:ph type="sldNum" sz="quarter" idx="5"/>
+          </p:nvPr>
+        </p:nvSpPr>
+        <p:spPr/>
+        <p:txBody>
+          <a:bodyPr/>
+          <a:lstStyle/>
+          <a:p>
+            <a:pPr rtl="1"/>
+            <a:fld id="{9C2B151B-D7D1-48E5-8230-5AADBC794F88}" type="slidenum">
+              <a:rPr lang="en-US" smtClean="0"/>
+              <a:pPr rtl="1"/>
+              <a:t>13</a:t>
+            </a:fld>
+            <a:endParaRPr lang="en-US"/>
+          </a:p>
+        </p:txBody>
+      </p:sp>
+    </p:spTree>
+    <p:extLst>
+      <p:ext uri="{BB962C8B-B14F-4D97-AF65-F5344CB8AC3E}">
+        <p14:creationId xmlns:p14="http://schemas.microsoft.com/office/powerpoint/2010/main" val="87813745"/>
+      </p:ext>
+    </p:extLst>
+  </p:cSld>
+  <p:clrMapOvr>
+    <a:masterClrMapping/>
+  </p:clrMapOvr>
+</p:notes>
+</file>
+
+<file path=ppt/notesSlides/notesSlide12.xml><?xml version="1.0" encoding="utf-8"?>
+<p:notes xmlns:a="http://schemas.openxmlformats.org/drawingml/2006/main" xmlns:r="http://schemas.openxmlformats.org/officeDocument/2006/relationships" xmlns:p="http://schemas.openxmlformats.org/presentationml/2006/main">
+  <p:cSld>
+    <p:spTree>
+      <p:nvGrpSpPr>
+        <p:cNvPr id="1" name=""/>
+        <p:cNvGrpSpPr/>
+        <p:nvPr/>
+      </p:nvGrpSpPr>
+      <p:grpSpPr>
+        <a:xfrm>
+          <a:off x="0" y="0"/>
+          <a:ext cx="0" cy="0"/>
+          <a:chOff x="0" y="0"/>
+          <a:chExt cx="0" cy="0"/>
+        </a:xfrm>
+      </p:grpSpPr>
+      <p:sp>
+        <p:nvSpPr>
+          <p:cNvPr id="2" name="מציין מיקום של תמונת שקופית 1"/>
+          <p:cNvSpPr>
+            <a:spLocks noGrp="1" noRot="1" noChangeAspect="1"/>
+          </p:cNvSpPr>
+          <p:nvPr>
+            <p:ph type="sldImg"/>
+          </p:nvPr>
+        </p:nvSpPr>
+        <p:spPr/>
+      </p:sp>
+      <p:sp>
+        <p:nvSpPr>
+          <p:cNvPr id="3" name="מציין מיקום של הערות 2"/>
+          <p:cNvSpPr>
+            <a:spLocks noGrp="1"/>
+          </p:cNvSpPr>
+          <p:nvPr>
+            <p:ph type="body" idx="1"/>
+          </p:nvPr>
+        </p:nvSpPr>
+        <p:spPr/>
+        <p:txBody>
+          <a:bodyPr/>
+          <a:lstStyle/>
+          <a:p>
+            <a:pPr marL="285750" indent="-285750" algn="l" rtl="0">
+              <a:buFont typeface="Arial" panose="020B0604020202020204" pitchFamily="34" charset="0"/>
+              <a:buChar char="•"/>
+            </a:pPr>
+            <a:r>
+              <a:rPr lang="en-US" sz="1200" dirty="0"/>
+              <a:t>Compared results across different trace counts</a:t>
+            </a:r>
+          </a:p>
+        </p:txBody>
+      </p:sp>
+      <p:sp>
+        <p:nvSpPr>
+          <p:cNvPr id="4" name="מציין מיקום של תאריך 3"/>
+          <p:cNvSpPr>
+            <a:spLocks noGrp="1"/>
+          </p:cNvSpPr>
+          <p:nvPr>
+            <p:ph type="dt" idx="1"/>
+          </p:nvPr>
+        </p:nvSpPr>
+        <p:spPr/>
+        <p:txBody>
+          <a:bodyPr/>
+          <a:lstStyle/>
+          <a:p>
+            <a:pPr rtl="1"/>
+            <a:fld id="{A740E3E4-E9D9-49FD-9F18-2E96717D35D6}" type="datetime1">
+              <a:rPr lang="he-IL" smtClean="0"/>
+              <a:t>א'/תמוז/תשפ"ד</a:t>
+            </a:fld>
+            <a:endParaRPr lang="en-US"/>
+          </a:p>
+        </p:txBody>
+      </p:sp>
+      <p:sp>
+        <p:nvSpPr>
+          <p:cNvPr id="5" name="מציין מיקום של מספר שקופית 4"/>
+          <p:cNvSpPr>
+            <a:spLocks noGrp="1"/>
+          </p:cNvSpPr>
+          <p:nvPr>
+            <p:ph type="sldNum" sz="quarter" idx="5"/>
+          </p:nvPr>
+        </p:nvSpPr>
+        <p:spPr/>
+        <p:txBody>
+          <a:bodyPr/>
+          <a:lstStyle/>
+          <a:p>
+            <a:pPr rtl="1"/>
+            <a:fld id="{9C2B151B-D7D1-48E5-8230-5AADBC794F88}" type="slidenum">
+              <a:rPr lang="en-US" smtClean="0"/>
+              <a:pPr rtl="1"/>
+              <a:t>14</a:t>
+            </a:fld>
+            <a:endParaRPr lang="en-US"/>
+          </a:p>
+        </p:txBody>
+      </p:sp>
+    </p:spTree>
+    <p:extLst>
+      <p:ext uri="{BB962C8B-B14F-4D97-AF65-F5344CB8AC3E}">
+        <p14:creationId xmlns:p14="http://schemas.microsoft.com/office/powerpoint/2010/main" val="1664067620"/>
+      </p:ext>
+    </p:extLst>
+  </p:cSld>
+  <p:clrMapOvr>
+    <a:masterClrMapping/>
+  </p:clrMapOvr>
+</p:notes>
+</file>
+
+<file path=ppt/notesSlides/notesSlide13.xml><?xml version="1.0" encoding="utf-8"?>
+<p:notes xmlns:a="http://schemas.openxmlformats.org/drawingml/2006/main" xmlns:r="http://schemas.openxmlformats.org/officeDocument/2006/relationships" xmlns:p="http://schemas.openxmlformats.org/presentationml/2006/main">
+  <p:cSld>
+    <p:spTree>
+      <p:nvGrpSpPr>
+        <p:cNvPr id="1" name=""/>
+        <p:cNvGrpSpPr/>
+        <p:nvPr/>
+      </p:nvGrpSpPr>
+      <p:grpSpPr>
+        <a:xfrm>
+          <a:off x="0" y="0"/>
+          <a:ext cx="0" cy="0"/>
+          <a:chOff x="0" y="0"/>
+          <a:chExt cx="0" cy="0"/>
+        </a:xfrm>
+      </p:grpSpPr>
+      <p:sp>
+        <p:nvSpPr>
+          <p:cNvPr id="2" name="מציין מיקום של תמונת שקופית 1"/>
+          <p:cNvSpPr>
+            <a:spLocks noGrp="1" noRot="1" noChangeAspect="1"/>
+          </p:cNvSpPr>
+          <p:nvPr>
+            <p:ph type="sldImg"/>
+          </p:nvPr>
+        </p:nvSpPr>
+        <p:spPr/>
+      </p:sp>
+      <p:sp>
+        <p:nvSpPr>
+          <p:cNvPr id="3" name="מציין מיקום של הערות 2"/>
+          <p:cNvSpPr>
+            <a:spLocks noGrp="1"/>
+          </p:cNvSpPr>
+          <p:nvPr>
+            <p:ph type="body" idx="1"/>
+          </p:nvPr>
+        </p:nvSpPr>
+        <p:spPr/>
+        <p:txBody>
+          <a:bodyPr/>
+          <a:lstStyle/>
+          <a:p>
+            <a:pPr marL="285750" indent="-285750" algn="l" rtl="0">
+              <a:buFont typeface="Arial" panose="020B0604020202020204" pitchFamily="34" charset="0"/>
+              <a:buChar char="•"/>
+            </a:pPr>
+            <a:r>
+              <a:rPr lang="en-US" sz="1200" dirty="0"/>
+              <a:t>Compared results across different trace counts</a:t>
+            </a:r>
+          </a:p>
+        </p:txBody>
+      </p:sp>
+      <p:sp>
+        <p:nvSpPr>
+          <p:cNvPr id="4" name="מציין מיקום של תאריך 3"/>
+          <p:cNvSpPr>
+            <a:spLocks noGrp="1"/>
+          </p:cNvSpPr>
+          <p:nvPr>
+            <p:ph type="dt" idx="1"/>
+          </p:nvPr>
+        </p:nvSpPr>
+        <p:spPr/>
+        <p:txBody>
+          <a:bodyPr/>
+          <a:lstStyle/>
+          <a:p>
+            <a:pPr rtl="1"/>
+            <a:fld id="{A740E3E4-E9D9-49FD-9F18-2E96717D35D6}" type="datetime1">
+              <a:rPr lang="he-IL" smtClean="0"/>
+              <a:t>א'/תמוז/תשפ"ד</a:t>
+            </a:fld>
+            <a:endParaRPr lang="en-US"/>
+          </a:p>
+        </p:txBody>
+      </p:sp>
+      <p:sp>
+        <p:nvSpPr>
+          <p:cNvPr id="5" name="מציין מיקום של מספר שקופית 4"/>
+          <p:cNvSpPr>
+            <a:spLocks noGrp="1"/>
+          </p:cNvSpPr>
+          <p:nvPr>
+            <p:ph type="sldNum" sz="quarter" idx="5"/>
+          </p:nvPr>
+        </p:nvSpPr>
+        <p:spPr/>
+        <p:txBody>
+          <a:bodyPr/>
+          <a:lstStyle/>
+          <a:p>
+            <a:pPr rtl="1"/>
+            <a:fld id="{9C2B151B-D7D1-48E5-8230-5AADBC794F88}" type="slidenum">
+              <a:rPr lang="en-US" smtClean="0"/>
+              <a:pPr rtl="1"/>
+              <a:t>15</a:t>
+            </a:fld>
+            <a:endParaRPr lang="en-US"/>
+          </a:p>
+        </p:txBody>
+      </p:sp>
+    </p:spTree>
+    <p:extLst>
+      <p:ext uri="{BB962C8B-B14F-4D97-AF65-F5344CB8AC3E}">
+        <p14:creationId xmlns:p14="http://schemas.microsoft.com/office/powerpoint/2010/main" val="2131492740"/>
       </p:ext>
     </p:extLst>
   </p:cSld>
@@ -1099,7 +1453,7 @@
             <a:pPr rtl="1"/>
             <a:fld id="{A740E3E4-E9D9-49FD-9F18-2E96717D35D6}" type="datetime1">
               <a:rPr lang="he-IL" smtClean="0"/>
-              <a:t>כ"ו/סיון/תשפ"ד</a:t>
+              <a:t>א'/תמוז/תשפ"ד</a:t>
             </a:fld>
             <a:endParaRPr lang="en-US"/>
           </a:p>
@@ -1213,7 +1567,7 @@
             <a:pPr rtl="1"/>
             <a:fld id="{A740E3E4-E9D9-49FD-9F18-2E96717D35D6}" type="datetime1">
               <a:rPr lang="he-IL" smtClean="0"/>
-              <a:t>כ"ו/סיון/תשפ"ד</a:t>
+              <a:t>א'/תמוז/תשפ"ד</a:t>
             </a:fld>
             <a:endParaRPr lang="en-US"/>
           </a:p>
@@ -1367,7 +1721,7 @@
             <a:pPr rtl="1"/>
             <a:fld id="{A740E3E4-E9D9-49FD-9F18-2E96717D35D6}" type="datetime1">
               <a:rPr lang="he-IL" smtClean="0"/>
-              <a:t>כ"ו/סיון/תשפ"ד</a:t>
+              <a:t>א'/תמוז/תשפ"ד</a:t>
             </a:fld>
             <a:endParaRPr lang="en-US"/>
           </a:p>
@@ -1477,7 +1831,7 @@
             <a:pPr rtl="1"/>
             <a:fld id="{A740E3E4-E9D9-49FD-9F18-2E96717D35D6}" type="datetime1">
               <a:rPr lang="he-IL" smtClean="0"/>
-              <a:t>כ"ו/סיון/תשפ"ד</a:t>
+              <a:t>א'/תמוז/תשפ"ד</a:t>
             </a:fld>
             <a:endParaRPr lang="en-US"/>
           </a:p>
@@ -1594,7 +1948,7 @@
             <a:pPr rtl="1"/>
             <a:fld id="{A740E3E4-E9D9-49FD-9F18-2E96717D35D6}" type="datetime1">
               <a:rPr lang="he-IL" smtClean="0"/>
-              <a:t>כ"ו/סיון/תשפ"ד</a:t>
+              <a:t>א'/תמוז/תשפ"ד</a:t>
             </a:fld>
             <a:endParaRPr lang="en-US"/>
           </a:p>
@@ -1711,7 +2065,7 @@
             <a:pPr rtl="1"/>
             <a:fld id="{A740E3E4-E9D9-49FD-9F18-2E96717D35D6}" type="datetime1">
               <a:rPr lang="he-IL" smtClean="0"/>
-              <a:t>כ"ו/סיון/תשפ"ד</a:t>
+              <a:t>א'/תמוז/תשפ"ד</a:t>
             </a:fld>
             <a:endParaRPr lang="en-US"/>
           </a:p>
@@ -1828,7 +2182,7 @@
             <a:pPr rtl="1"/>
             <a:fld id="{A740E3E4-E9D9-49FD-9F18-2E96717D35D6}" type="datetime1">
               <a:rPr lang="he-IL" smtClean="0"/>
-              <a:t>כ"ו/סיון/תשפ"ד</a:t>
+              <a:t>א'/תמוז/תשפ"ד</a:t>
             </a:fld>
             <a:endParaRPr lang="en-US"/>
           </a:p>
@@ -1945,7 +2299,7 @@
             <a:pPr rtl="1"/>
             <a:fld id="{A740E3E4-E9D9-49FD-9F18-2E96717D35D6}" type="datetime1">
               <a:rPr lang="he-IL" smtClean="0"/>
-              <a:t>כ"ו/סיון/תשפ"ד</a:t>
+              <a:t>א'/תמוז/תשפ"ד</a:t>
             </a:fld>
             <a:endParaRPr lang="en-US"/>
           </a:p>
@@ -2255,7 +2609,7 @@
             <a:pPr rtl="1"/>
             <a:fld id="{04A3E967-8D5C-4DDD-9C40-DF34C54C2F3C}" type="datetime1">
               <a:rPr lang="he-IL" smtClean="0"/>
-              <a:t>כ"ו/סיון/תשפ"ד</a:t>
+              <a:t>א'/תמוז/תשפ"ד</a:t>
             </a:fld>
             <a:endParaRPr lang="en-US" dirty="0"/>
           </a:p>
@@ -2505,7 +2859,7 @@
             <a:pPr rtl="1"/>
             <a:fld id="{05D0A03C-C8B9-4C44-8800-9AB775257217}" type="datetime1">
               <a:rPr lang="he-IL" smtClean="0"/>
-              <a:t>כ"ו/סיון/תשפ"ד</a:t>
+              <a:t>א'/תמוז/תשפ"ד</a:t>
             </a:fld>
             <a:endParaRPr lang="en-US" dirty="0"/>
           </a:p>
@@ -2807,7 +3161,7 @@
             <a:pPr rtl="1"/>
             <a:fld id="{4C0F065D-908A-45E9-9C31-8EAE27922426}" type="datetime1">
               <a:rPr lang="he-IL" smtClean="0"/>
-              <a:t>כ"ו/סיון/תשפ"ד</a:t>
+              <a:t>א'/תמוז/תשפ"ד</a:t>
             </a:fld>
             <a:endParaRPr lang="en-US" dirty="0"/>
           </a:p>
@@ -3057,7 +3411,7 @@
             <a:pPr rtl="1"/>
             <a:fld id="{9485C861-67B5-4004-B8E7-860D0705DFD9}" type="datetime1">
               <a:rPr lang="he-IL" smtClean="0"/>
-              <a:t>כ"ו/סיון/תשפ"ד</a:t>
+              <a:t>א'/תמוז/תשפ"ד</a:t>
             </a:fld>
             <a:endParaRPr lang="en-US" dirty="0"/>
           </a:p>
@@ -3472,7 +3826,7 @@
             <a:pPr rtl="1"/>
             <a:fld id="{789F741F-7A1D-4906-9C55-362A48C9A3EE}" type="datetime1">
               <a:rPr lang="he-IL" smtClean="0"/>
-              <a:t>כ"ו/סיון/תשפ"ד</a:t>
+              <a:t>א'/תמוז/תשפ"ד</a:t>
             </a:fld>
             <a:endParaRPr lang="en-US" dirty="0"/>
           </a:p>
@@ -3811,7 +4165,7 @@
             <a:pPr rtl="1"/>
             <a:fld id="{1CEF6CD0-317B-4DC1-9C07-2CAF6E3BCCA1}" type="datetime1">
               <a:rPr lang="he-IL" smtClean="0"/>
-              <a:t>כ"ו/סיון/תשפ"ד</a:t>
+              <a:t>א'/תמוז/תשפ"ד</a:t>
             </a:fld>
             <a:endParaRPr lang="en-US" dirty="0"/>
           </a:p>
@@ -4292,7 +4646,7 @@
             <a:pPr rtl="1"/>
             <a:fld id="{2B7B873B-D916-4AD6-B2D8-7D9E14E6715C}" type="datetime1">
               <a:rPr lang="he-IL" smtClean="0"/>
-              <a:t>כ"ו/סיון/תשפ"ד</a:t>
+              <a:t>א'/תמוז/תשפ"ד</a:t>
             </a:fld>
             <a:endParaRPr lang="en-US" dirty="0"/>
           </a:p>
@@ -4469,7 +4823,7 @@
             <a:pPr rtl="1"/>
             <a:fld id="{25FDD4EA-431A-4956-84A7-9DE9D45B98C7}" type="datetime1">
               <a:rPr lang="he-IL" smtClean="0"/>
-              <a:t>כ"ו/סיון/תשפ"ד</a:t>
+              <a:t>א'/תמוז/תשפ"ד</a:t>
             </a:fld>
             <a:endParaRPr lang="en-US" dirty="0"/>
           </a:p>
@@ -4665,7 +5019,7 @@
             <a:pPr rtl="1"/>
             <a:fld id="{75FA6EE9-C983-4E79-A3A9-F3233CDF6463}" type="datetime1">
               <a:rPr lang="he-IL" smtClean="0"/>
-              <a:t>כ"ו/סיון/תשפ"ד</a:t>
+              <a:t>א'/תמוז/תשפ"ד</a:t>
             </a:fld>
             <a:endParaRPr lang="en-US" dirty="0"/>
           </a:p>
@@ -5041,7 +5395,7 @@
             <a:pPr rtl="1"/>
             <a:fld id="{1925123A-C1B7-4A4E-9A5A-EF1A061AC565}" type="datetime1">
               <a:rPr lang="he-IL" smtClean="0"/>
-              <a:t>כ"ו/סיון/תשפ"ד</a:t>
+              <a:t>א'/תמוז/תשפ"ד</a:t>
             </a:fld>
             <a:endParaRPr lang="en-US" dirty="0"/>
           </a:p>
@@ -5414,7 +5768,7 @@
             <a:pPr rtl="1"/>
             <a:fld id="{D81963C7-ABB7-4377-AD52-032180F16D33}" type="datetime1">
               <a:rPr lang="he-IL" smtClean="0"/>
-              <a:t>כ"ו/סיון/תשפ"ד</a:t>
+              <a:t>א'/תמוז/תשפ"ד</a:t>
             </a:fld>
             <a:endParaRPr lang="en-US" dirty="0"/>
           </a:p>
@@ -5694,7 +6048,7 @@
           <a:p>
             <a:fld id="{7576A16E-93FE-44E3-8B4E-30CF52038E38}" type="datetime1">
               <a:rPr lang="he-IL" smtClean="0"/>
-              <a:t>כ"ו/סיון/תשפ"ד</a:t>
+              <a:t>א'/תמוז/תשפ"ד</a:t>
             </a:fld>
             <a:endParaRPr lang="en-US" dirty="0"/>
           </a:p>
@@ -6616,7 +6970,7 @@
             </a:pPr>
             <a:r>
               <a:rPr lang="en-US" sz="3200" dirty="0"/>
-              <a:t>All Traces:</a:t>
+              <a:t>35 Most Common Traces:</a:t>
             </a:r>
           </a:p>
           <a:p>
@@ -6637,10 +6991,10 @@
       </p:sp>
       <p:pic>
         <p:nvPicPr>
-          <p:cNvPr id="6" name="תמונה 5">
+          <p:cNvPr id="4" name="תמונה 3" descr="תמונה שמכילה תרשים, קו, לבן, שרטוט&#10;&#10;התיאור נוצר באופן אוטומטי">
             <a:extLst>
               <a:ext uri="{FF2B5EF4-FFF2-40B4-BE49-F238E27FC236}">
-                <a16:creationId xmlns:a16="http://schemas.microsoft.com/office/drawing/2014/main" id="{6DADA652-58C8-59E5-D71C-128F425B99DC}"/>
+                <a16:creationId xmlns:a16="http://schemas.microsoft.com/office/drawing/2014/main" id="{008FEDC0-1881-2AD1-F6FF-4C3076D9EFDF}"/>
               </a:ext>
             </a:extLst>
           </p:cNvPr>
@@ -6650,15 +7004,21 @@
           <p:nvPr/>
         </p:nvPicPr>
         <p:blipFill>
-          <a:blip r:embed="rId3"/>
+          <a:blip r:embed="rId3">
+            <a:extLst>
+              <a:ext uri="{28A0092B-C50C-407E-A947-70E740481C1C}">
+                <a14:useLocalDpi xmlns:a14="http://schemas.microsoft.com/office/drawing/2010/main" val="0"/>
+              </a:ext>
+            </a:extLst>
+          </a:blip>
           <a:stretch>
             <a:fillRect/>
           </a:stretch>
         </p:blipFill>
         <p:spPr>
           <a:xfrm>
-            <a:off x="1209964" y="2665658"/>
-            <a:ext cx="8915400" cy="3646937"/>
+            <a:off x="-30480" y="2681855"/>
+            <a:ext cx="12192000" cy="3556561"/>
           </a:xfrm>
           <a:prstGeom prst="rect">
             <a:avLst/>
@@ -6859,7 +7219,7 @@
         <p:spPr>
           <a:xfrm>
             <a:off x="1036320" y="1995055"/>
-            <a:ext cx="9945716" cy="3539430"/>
+            <a:ext cx="9945716" cy="2554545"/>
           </a:xfrm>
           <a:prstGeom prst="rect">
             <a:avLst/>
@@ -6878,7 +7238,526 @@
             </a:pPr>
             <a:r>
               <a:rPr lang="en-US" sz="3200" dirty="0"/>
-              <a:t>Most common trace only:</a:t>
+              <a:t>1 most common traces:</a:t>
+            </a:r>
+          </a:p>
+          <a:p>
+            <a:pPr algn="l" rtl="0"/>
+            <a:endParaRPr lang="en-US" sz="3200" dirty="0"/>
+          </a:p>
+          <a:p>
+            <a:pPr marL="285750" indent="-285750" algn="l" rtl="0">
+              <a:buFont typeface="Arial" panose="020B0604020202020204" pitchFamily="34" charset="0"/>
+              <a:buChar char="•"/>
+            </a:pPr>
+            <a:r>
+              <a:rPr lang="en-US" sz="3200" dirty="0"/>
+              <a:t>3 most common traces:</a:t>
+            </a:r>
+          </a:p>
+          <a:p>
+            <a:pPr algn="l" rtl="0"/>
+            <a:endParaRPr lang="en-US" sz="3200" dirty="0"/>
+          </a:p>
+          <a:p>
+            <a:pPr marL="285750" indent="-285750" algn="l" rtl="0">
+              <a:buFont typeface="Arial" panose="020B0604020202020204" pitchFamily="34" charset="0"/>
+              <a:buChar char="•"/>
+            </a:pPr>
+            <a:r>
+              <a:rPr lang="en-US" sz="3200" dirty="0"/>
+              <a:t>5 most common traces:</a:t>
+            </a:r>
+          </a:p>
+        </p:txBody>
+      </p:sp>
+      <p:pic>
+        <p:nvPicPr>
+          <p:cNvPr id="9" name="תמונה 8" descr="תמונה שמכילה טקסט, גופן, קבלה, לבן&#10;&#10;התיאור נוצר באופן אוטומטי">
+            <a:extLst>
+              <a:ext uri="{FF2B5EF4-FFF2-40B4-BE49-F238E27FC236}">
+                <a16:creationId xmlns:a16="http://schemas.microsoft.com/office/drawing/2014/main" id="{787061F5-8B2C-0F8D-8770-7D443E76E512}"/>
+              </a:ext>
+            </a:extLst>
+          </p:cNvPr>
+          <p:cNvPicPr>
+            <a:picLocks noChangeAspect="1"/>
+          </p:cNvPicPr>
+          <p:nvPr/>
+        </p:nvPicPr>
+        <p:blipFill>
+          <a:blip r:embed="rId3">
+            <a:extLst>
+              <a:ext uri="{28A0092B-C50C-407E-A947-70E740481C1C}">
+                <a14:useLocalDpi xmlns:a14="http://schemas.microsoft.com/office/drawing/2010/main" val="0"/>
+              </a:ext>
+            </a:extLst>
+          </a:blip>
+          <a:stretch>
+            <a:fillRect/>
+          </a:stretch>
+        </p:blipFill>
+        <p:spPr>
+          <a:xfrm>
+            <a:off x="5815789" y="3039365"/>
+            <a:ext cx="2534003" cy="1129743"/>
+          </a:xfrm>
+          <a:prstGeom prst="rect">
+            <a:avLst/>
+          </a:prstGeom>
+        </p:spPr>
+      </p:pic>
+      <p:pic>
+        <p:nvPicPr>
+          <p:cNvPr id="19" name="תמונה 18">
+            <a:extLst>
+              <a:ext uri="{FF2B5EF4-FFF2-40B4-BE49-F238E27FC236}">
+                <a16:creationId xmlns:a16="http://schemas.microsoft.com/office/drawing/2014/main" id="{D2490E34-37C1-7D97-F145-1D55C12D8C1A}"/>
+              </a:ext>
+            </a:extLst>
+          </p:cNvPr>
+          <p:cNvPicPr>
+            <a:picLocks noChangeAspect="1"/>
+          </p:cNvPicPr>
+          <p:nvPr/>
+        </p:nvPicPr>
+        <p:blipFill>
+          <a:blip r:embed="rId4"/>
+          <a:stretch>
+            <a:fillRect/>
+          </a:stretch>
+        </p:blipFill>
+        <p:spPr>
+          <a:xfrm>
+            <a:off x="5911592" y="2020178"/>
+            <a:ext cx="2476846" cy="952633"/>
+          </a:xfrm>
+          <a:prstGeom prst="rect">
+            <a:avLst/>
+          </a:prstGeom>
+        </p:spPr>
+      </p:pic>
+      <p:pic>
+        <p:nvPicPr>
+          <p:cNvPr id="21" name="תמונה 20">
+            <a:extLst>
+              <a:ext uri="{FF2B5EF4-FFF2-40B4-BE49-F238E27FC236}">
+                <a16:creationId xmlns:a16="http://schemas.microsoft.com/office/drawing/2014/main" id="{5AF9AF97-6C40-45FB-0ACF-A1259982BDF1}"/>
+              </a:ext>
+            </a:extLst>
+          </p:cNvPr>
+          <p:cNvPicPr>
+            <a:picLocks noChangeAspect="1"/>
+          </p:cNvPicPr>
+          <p:nvPr/>
+        </p:nvPicPr>
+        <p:blipFill>
+          <a:blip r:embed="rId5"/>
+          <a:stretch>
+            <a:fillRect/>
+          </a:stretch>
+        </p:blipFill>
+        <p:spPr>
+          <a:xfrm>
+            <a:off x="5815789" y="4375835"/>
+            <a:ext cx="2372056" cy="962159"/>
+          </a:xfrm>
+          <a:prstGeom prst="rect">
+            <a:avLst/>
+          </a:prstGeom>
+        </p:spPr>
+      </p:pic>
+    </p:spTree>
+    <p:extLst>
+      <p:ext uri="{BB962C8B-B14F-4D97-AF65-F5344CB8AC3E}">
+        <p14:creationId xmlns:p14="http://schemas.microsoft.com/office/powerpoint/2010/main" val="3392102478"/>
+      </p:ext>
+    </p:extLst>
+  </p:cSld>
+  <p:clrMapOvr>
+    <a:masterClrMapping/>
+  </p:clrMapOvr>
+</p:sld>
+</file>
+
+<file path=ppt/slides/slide13.xml><?xml version="1.0" encoding="utf-8"?>
+<p:sld xmlns:a="http://schemas.openxmlformats.org/drawingml/2006/main" xmlns:r="http://schemas.openxmlformats.org/officeDocument/2006/relationships" xmlns:p="http://schemas.openxmlformats.org/presentationml/2006/main">
+  <p:cSld>
+    <p:spTree>
+      <p:nvGrpSpPr>
+        <p:cNvPr id="1" name=""/>
+        <p:cNvGrpSpPr/>
+        <p:nvPr/>
+      </p:nvGrpSpPr>
+      <p:grpSpPr>
+        <a:xfrm>
+          <a:off x="0" y="0"/>
+          <a:ext cx="0" cy="0"/>
+          <a:chOff x="0" y="0"/>
+          <a:chExt cx="0" cy="0"/>
+        </a:xfrm>
+      </p:grpSpPr>
+      <p:sp>
+        <p:nvSpPr>
+          <p:cNvPr id="2" name="כותרת 1">
+            <a:extLst>
+              <a:ext uri="{FF2B5EF4-FFF2-40B4-BE49-F238E27FC236}">
+                <a16:creationId xmlns:a16="http://schemas.microsoft.com/office/drawing/2014/main" id="{0CFC4EF2-1DDF-4B40-D714-5DC3D97EDEC8}"/>
+              </a:ext>
+            </a:extLst>
+          </p:cNvPr>
+          <p:cNvSpPr>
+            <a:spLocks noGrp="1"/>
+          </p:cNvSpPr>
+          <p:nvPr>
+            <p:ph type="title"/>
+          </p:nvPr>
+        </p:nvSpPr>
+        <p:spPr/>
+        <p:txBody>
+          <a:bodyPr/>
+          <a:lstStyle/>
+          <a:p>
+            <a:pPr algn="l" rtl="0"/>
+            <a:r>
+              <a:rPr lang="en-US" dirty="0"/>
+              <a:t>Distribution of events over time</a:t>
+            </a:r>
+          </a:p>
+        </p:txBody>
+      </p:sp>
+      <p:pic>
+        <p:nvPicPr>
+          <p:cNvPr id="2050" name="Picture 2">
+            <a:extLst>
+              <a:ext uri="{FF2B5EF4-FFF2-40B4-BE49-F238E27FC236}">
+                <a16:creationId xmlns:a16="http://schemas.microsoft.com/office/drawing/2014/main" id="{D054A6BF-731E-D502-DB07-2E6504E7F30F}"/>
+              </a:ext>
+            </a:extLst>
+          </p:cNvPr>
+          <p:cNvPicPr>
+            <a:picLocks noChangeAspect="1" noChangeArrowheads="1"/>
+          </p:cNvPicPr>
+          <p:nvPr/>
+        </p:nvPicPr>
+        <p:blipFill>
+          <a:blip r:embed="rId3">
+            <a:extLst>
+              <a:ext uri="{28A0092B-C50C-407E-A947-70E740481C1C}">
+                <a14:useLocalDpi xmlns:a14="http://schemas.microsoft.com/office/drawing/2010/main" val="0"/>
+              </a:ext>
+            </a:extLst>
+          </a:blip>
+          <a:srcRect/>
+          <a:stretch>
+            <a:fillRect/>
+          </a:stretch>
+        </p:blipFill>
+        <p:spPr bwMode="auto">
+          <a:xfrm>
+            <a:off x="1865779" y="3461144"/>
+            <a:ext cx="3005477" cy="2616656"/>
+          </a:xfrm>
+          <a:prstGeom prst="rect">
+            <a:avLst/>
+          </a:prstGeom>
+          <a:noFill/>
+          <a:extLst>
+            <a:ext uri="{909E8E84-426E-40DD-AFC4-6F175D3DCCD1}">
+              <a14:hiddenFill xmlns:a14="http://schemas.microsoft.com/office/drawing/2010/main">
+                <a:solidFill>
+                  <a:srgbClr val="FFFFFF"/>
+                </a:solidFill>
+              </a14:hiddenFill>
+            </a:ext>
+          </a:extLst>
+        </p:spPr>
+      </p:pic>
+      <p:pic>
+        <p:nvPicPr>
+          <p:cNvPr id="2052" name="Picture 4">
+            <a:extLst>
+              <a:ext uri="{FF2B5EF4-FFF2-40B4-BE49-F238E27FC236}">
+                <a16:creationId xmlns:a16="http://schemas.microsoft.com/office/drawing/2014/main" id="{189C3C3F-EB37-117C-64AE-993B22EBC738}"/>
+              </a:ext>
+            </a:extLst>
+          </p:cNvPr>
+          <p:cNvPicPr>
+            <a:picLocks noChangeAspect="1" noChangeArrowheads="1"/>
+          </p:cNvPicPr>
+          <p:nvPr/>
+        </p:nvPicPr>
+        <p:blipFill>
+          <a:blip r:embed="rId4">
+            <a:extLst>
+              <a:ext uri="{28A0092B-C50C-407E-A947-70E740481C1C}">
+                <a14:useLocalDpi xmlns:a14="http://schemas.microsoft.com/office/drawing/2010/main" val="0"/>
+              </a:ext>
+            </a:extLst>
+          </a:blip>
+          <a:srcRect/>
+          <a:stretch>
+            <a:fillRect/>
+          </a:stretch>
+        </p:blipFill>
+        <p:spPr bwMode="auto">
+          <a:xfrm>
+            <a:off x="6463329" y="3461145"/>
+            <a:ext cx="3353024" cy="2616655"/>
+          </a:xfrm>
+          <a:prstGeom prst="rect">
+            <a:avLst/>
+          </a:prstGeom>
+          <a:noFill/>
+          <a:extLst>
+            <a:ext uri="{909E8E84-426E-40DD-AFC4-6F175D3DCCD1}">
+              <a14:hiddenFill xmlns:a14="http://schemas.microsoft.com/office/drawing/2010/main">
+                <a:solidFill>
+                  <a:srgbClr val="FFFFFF"/>
+                </a:solidFill>
+              </a14:hiddenFill>
+            </a:ext>
+          </a:extLst>
+        </p:spPr>
+      </p:pic>
+      <p:sp>
+        <p:nvSpPr>
+          <p:cNvPr id="6" name="תיבת טקסט 5">
+            <a:extLst>
+              <a:ext uri="{FF2B5EF4-FFF2-40B4-BE49-F238E27FC236}">
+                <a16:creationId xmlns:a16="http://schemas.microsoft.com/office/drawing/2014/main" id="{B6F58900-E2B7-0192-F5E5-38DC4B9A5A29}"/>
+              </a:ext>
+            </a:extLst>
+          </p:cNvPr>
+          <p:cNvSpPr txBox="1"/>
+          <p:nvPr/>
+        </p:nvSpPr>
+        <p:spPr>
+          <a:xfrm>
+            <a:off x="1036320" y="1995055"/>
+            <a:ext cx="9945716" cy="1077218"/>
+          </a:xfrm>
+          <a:prstGeom prst="rect">
+            <a:avLst/>
+          </a:prstGeom>
+          <a:noFill/>
+        </p:spPr>
+        <p:txBody>
+          <a:bodyPr wrap="square" rtlCol="1">
+            <a:spAutoFit/>
+          </a:bodyPr>
+          <a:lstStyle/>
+          <a:p>
+            <a:pPr marL="285750" indent="-285750" algn="l" rtl="0">
+              <a:buFont typeface="Arial" panose="020B0604020202020204" pitchFamily="34" charset="0"/>
+              <a:buChar char="•"/>
+            </a:pPr>
+            <a:r>
+              <a:rPr lang="en-US" sz="3200" dirty="0"/>
+              <a:t>Hourly and date analysis</a:t>
+            </a:r>
+          </a:p>
+          <a:p>
+            <a:pPr marL="285750" indent="-285750" algn="l" rtl="0">
+              <a:buFont typeface="Arial" panose="020B0604020202020204" pitchFamily="34" charset="0"/>
+              <a:buChar char="•"/>
+            </a:pPr>
+            <a:r>
+              <a:rPr lang="en-US" sz="3200" dirty="0"/>
+              <a:t>Time is important attribute </a:t>
+            </a:r>
+          </a:p>
+        </p:txBody>
+      </p:sp>
+    </p:spTree>
+    <p:extLst>
+      <p:ext uri="{BB962C8B-B14F-4D97-AF65-F5344CB8AC3E}">
+        <p14:creationId xmlns:p14="http://schemas.microsoft.com/office/powerpoint/2010/main" val="3101082670"/>
+      </p:ext>
+    </p:extLst>
+  </p:cSld>
+  <p:clrMapOvr>
+    <a:masterClrMapping/>
+  </p:clrMapOvr>
+</p:sld>
+</file>
+
+<file path=ppt/slides/slide14.xml><?xml version="1.0" encoding="utf-8"?>
+<p:sld xmlns:a="http://schemas.openxmlformats.org/drawingml/2006/main" xmlns:r="http://schemas.openxmlformats.org/officeDocument/2006/relationships" xmlns:p="http://schemas.openxmlformats.org/presentationml/2006/main">
+  <p:cSld>
+    <p:spTree>
+      <p:nvGrpSpPr>
+        <p:cNvPr id="1" name=""/>
+        <p:cNvGrpSpPr/>
+        <p:nvPr/>
+      </p:nvGrpSpPr>
+      <p:grpSpPr>
+        <a:xfrm>
+          <a:off x="0" y="0"/>
+          <a:ext cx="0" cy="0"/>
+          <a:chOff x="0" y="0"/>
+          <a:chExt cx="0" cy="0"/>
+        </a:xfrm>
+      </p:grpSpPr>
+      <p:sp>
+        <p:nvSpPr>
+          <p:cNvPr id="2" name="כותרת 1">
+            <a:extLst>
+              <a:ext uri="{FF2B5EF4-FFF2-40B4-BE49-F238E27FC236}">
+                <a16:creationId xmlns:a16="http://schemas.microsoft.com/office/drawing/2014/main" id="{0CFC4EF2-1DDF-4B40-D714-5DC3D97EDEC8}"/>
+              </a:ext>
+            </a:extLst>
+          </p:cNvPr>
+          <p:cNvSpPr>
+            <a:spLocks noGrp="1"/>
+          </p:cNvSpPr>
+          <p:nvPr>
+            <p:ph type="title"/>
+          </p:nvPr>
+        </p:nvSpPr>
+        <p:spPr/>
+        <p:txBody>
+          <a:bodyPr/>
+          <a:lstStyle/>
+          <a:p>
+            <a:pPr algn="l" rtl="0"/>
+            <a:r>
+              <a:rPr lang="en-US" dirty="0"/>
+              <a:t>Further analysis – time and frequency </a:t>
+            </a:r>
+            <a:endParaRPr lang="he-IL" dirty="0"/>
+          </a:p>
+        </p:txBody>
+      </p:sp>
+      <p:pic>
+        <p:nvPicPr>
+          <p:cNvPr id="1026" name="Picture 2">
+            <a:extLst>
+              <a:ext uri="{FF2B5EF4-FFF2-40B4-BE49-F238E27FC236}">
+                <a16:creationId xmlns:a16="http://schemas.microsoft.com/office/drawing/2014/main" id="{1C4B54C6-AA1D-EAA3-0B55-3C9F9E0C4F7F}"/>
+              </a:ext>
+            </a:extLst>
+          </p:cNvPr>
+          <p:cNvPicPr>
+            <a:picLocks noChangeAspect="1" noChangeArrowheads="1"/>
+          </p:cNvPicPr>
+          <p:nvPr/>
+        </p:nvPicPr>
+        <p:blipFill>
+          <a:blip r:embed="rId3">
+            <a:extLst>
+              <a:ext uri="{28A0092B-C50C-407E-A947-70E740481C1C}">
+                <a14:useLocalDpi xmlns:a14="http://schemas.microsoft.com/office/drawing/2010/main" val="0"/>
+              </a:ext>
+            </a:extLst>
+          </a:blip>
+          <a:srcRect/>
+          <a:stretch>
+            <a:fillRect/>
+          </a:stretch>
+        </p:blipFill>
+        <p:spPr bwMode="auto">
+          <a:xfrm>
+            <a:off x="858370" y="4930236"/>
+            <a:ext cx="10475259" cy="1563105"/>
+          </a:xfrm>
+          <a:prstGeom prst="rect">
+            <a:avLst/>
+          </a:prstGeom>
+          <a:noFill/>
+          <a:extLst>
+            <a:ext uri="{909E8E84-426E-40DD-AFC4-6F175D3DCCD1}">
+              <a14:hiddenFill xmlns:a14="http://schemas.microsoft.com/office/drawing/2010/main">
+                <a:solidFill>
+                  <a:srgbClr val="FFFFFF"/>
+                </a:solidFill>
+              </a14:hiddenFill>
+            </a:ext>
+          </a:extLst>
+        </p:spPr>
+      </p:pic>
+      <p:pic>
+        <p:nvPicPr>
+          <p:cNvPr id="1028" name="Picture 4">
+            <a:extLst>
+              <a:ext uri="{FF2B5EF4-FFF2-40B4-BE49-F238E27FC236}">
+                <a16:creationId xmlns:a16="http://schemas.microsoft.com/office/drawing/2014/main" id="{1B372411-CFB1-6D8B-BB89-792D6EC48885}"/>
+              </a:ext>
+            </a:extLst>
+          </p:cNvPr>
+          <p:cNvPicPr>
+            <a:picLocks noChangeAspect="1" noChangeArrowheads="1"/>
+          </p:cNvPicPr>
+          <p:nvPr/>
+        </p:nvPicPr>
+        <p:blipFill>
+          <a:blip r:embed="rId4">
+            <a:extLst>
+              <a:ext uri="{28A0092B-C50C-407E-A947-70E740481C1C}">
+                <a14:useLocalDpi xmlns:a14="http://schemas.microsoft.com/office/drawing/2010/main" val="0"/>
+              </a:ext>
+            </a:extLst>
+          </a:blip>
+          <a:srcRect/>
+          <a:stretch>
+            <a:fillRect/>
+          </a:stretch>
+        </p:blipFill>
+        <p:spPr bwMode="auto">
+          <a:xfrm>
+            <a:off x="1438836" y="2706710"/>
+            <a:ext cx="8713694" cy="1545319"/>
+          </a:xfrm>
+          <a:prstGeom prst="rect">
+            <a:avLst/>
+          </a:prstGeom>
+          <a:noFill/>
+          <a:extLst>
+            <a:ext uri="{909E8E84-426E-40DD-AFC4-6F175D3DCCD1}">
+              <a14:hiddenFill xmlns:a14="http://schemas.microsoft.com/office/drawing/2010/main">
+                <a:solidFill>
+                  <a:srgbClr val="FFFFFF"/>
+                </a:solidFill>
+              </a14:hiddenFill>
+            </a:ext>
+          </a:extLst>
+        </p:spPr>
+      </p:pic>
+      <p:sp>
+        <p:nvSpPr>
+          <p:cNvPr id="3" name="תיבת טקסט 2">
+            <a:extLst>
+              <a:ext uri="{FF2B5EF4-FFF2-40B4-BE49-F238E27FC236}">
+                <a16:creationId xmlns:a16="http://schemas.microsoft.com/office/drawing/2014/main" id="{035A743F-F4A8-DDE8-76F2-128193759255}"/>
+              </a:ext>
+            </a:extLst>
+          </p:cNvPr>
+          <p:cNvSpPr txBox="1"/>
+          <p:nvPr/>
+        </p:nvSpPr>
+        <p:spPr>
+          <a:xfrm>
+            <a:off x="1036320" y="1995055"/>
+            <a:ext cx="9945716" cy="2554545"/>
+          </a:xfrm>
+          <a:prstGeom prst="rect">
+            <a:avLst/>
+          </a:prstGeom>
+          <a:noFill/>
+        </p:spPr>
+        <p:txBody>
+          <a:bodyPr wrap="square" rtlCol="1">
+            <a:spAutoFit/>
+          </a:bodyPr>
+          <a:lstStyle/>
+          <a:p>
+            <a:pPr marL="285750" indent="-285750" algn="l" rtl="0">
+              <a:buFont typeface="Arial" panose="020B0604020202020204" pitchFamily="34" charset="0"/>
+              <a:buChar char="•"/>
+            </a:pPr>
+            <a:r>
+              <a:rPr lang="en-US" sz="3200" dirty="0"/>
+              <a:t>Temporal Information</a:t>
             </a:r>
           </a:p>
           <a:p>
@@ -6900,41 +7779,258 @@
               <a:buFont typeface="Arial" panose="020B0604020202020204" pitchFamily="34" charset="0"/>
               <a:buChar char="•"/>
             </a:pPr>
-            <a:r>
-              <a:rPr lang="en-US" sz="3200" dirty="0"/>
-              <a:t>10 most common traces:</a:t>
-            </a:r>
+            <a:endParaRPr lang="en-US" sz="3200" dirty="0"/>
           </a:p>
           <a:p>
             <a:pPr marL="285750" indent="-285750" algn="l" rtl="0">
               <a:buFont typeface="Arial" panose="020B0604020202020204" pitchFamily="34" charset="0"/>
               <a:buChar char="•"/>
             </a:pPr>
-            <a:endParaRPr lang="en-US" sz="3200" dirty="0"/>
+            <a:r>
+              <a:rPr lang="en-US" sz="3200" dirty="0"/>
+              <a:t>Frequency Information</a:t>
+            </a:r>
+          </a:p>
+        </p:txBody>
+      </p:sp>
+    </p:spTree>
+    <p:extLst>
+      <p:ext uri="{BB962C8B-B14F-4D97-AF65-F5344CB8AC3E}">
+        <p14:creationId xmlns:p14="http://schemas.microsoft.com/office/powerpoint/2010/main" val="1336631956"/>
+      </p:ext>
+    </p:extLst>
+  </p:cSld>
+  <p:clrMapOvr>
+    <a:masterClrMapping/>
+  </p:clrMapOvr>
+</p:sld>
+</file>
+
+<file path=ppt/slides/slide15.xml><?xml version="1.0" encoding="utf-8"?>
+<p:sld xmlns:a="http://schemas.openxmlformats.org/drawingml/2006/main" xmlns:r="http://schemas.openxmlformats.org/officeDocument/2006/relationships" xmlns:p="http://schemas.openxmlformats.org/presentationml/2006/main">
+  <p:cSld>
+    <p:spTree>
+      <p:nvGrpSpPr>
+        <p:cNvPr id="1" name=""/>
+        <p:cNvGrpSpPr/>
+        <p:nvPr/>
+      </p:nvGrpSpPr>
+      <p:grpSpPr>
+        <a:xfrm>
+          <a:off x="0" y="0"/>
+          <a:ext cx="0" cy="0"/>
+          <a:chOff x="0" y="0"/>
+          <a:chExt cx="0" cy="0"/>
+        </a:xfrm>
+      </p:grpSpPr>
+      <p:sp>
+        <p:nvSpPr>
+          <p:cNvPr id="2" name="כותרת 1">
+            <a:extLst>
+              <a:ext uri="{FF2B5EF4-FFF2-40B4-BE49-F238E27FC236}">
+                <a16:creationId xmlns:a16="http://schemas.microsoft.com/office/drawing/2014/main" id="{0CFC4EF2-1DDF-4B40-D714-5DC3D97EDEC8}"/>
+              </a:ext>
+            </a:extLst>
+          </p:cNvPr>
+          <p:cNvSpPr>
+            <a:spLocks noGrp="1"/>
+          </p:cNvSpPr>
+          <p:nvPr>
+            <p:ph type="title"/>
+          </p:nvPr>
+        </p:nvSpPr>
+        <p:spPr/>
+        <p:txBody>
+          <a:bodyPr/>
+          <a:lstStyle/>
+          <a:p>
+            <a:pPr algn="l" rtl="0"/>
+            <a:r>
+              <a:rPr lang="en-US" dirty="0"/>
+              <a:t>Mining Decision Points</a:t>
+            </a:r>
+            <a:endParaRPr lang="he-IL" dirty="0"/>
+          </a:p>
+        </p:txBody>
+      </p:sp>
+      <p:pic>
+        <p:nvPicPr>
+          <p:cNvPr id="3074" name="Picture 2">
+            <a:extLst>
+              <a:ext uri="{FF2B5EF4-FFF2-40B4-BE49-F238E27FC236}">
+                <a16:creationId xmlns:a16="http://schemas.microsoft.com/office/drawing/2014/main" id="{68A4CF71-267E-25C5-A490-4DA786BCD204}"/>
+              </a:ext>
+            </a:extLst>
+          </p:cNvPr>
+          <p:cNvPicPr>
+            <a:picLocks noChangeAspect="1" noChangeArrowheads="1"/>
+          </p:cNvPicPr>
+          <p:nvPr/>
+        </p:nvPicPr>
+        <p:blipFill>
+          <a:blip r:embed="rId3">
+            <a:extLst>
+              <a:ext uri="{28A0092B-C50C-407E-A947-70E740481C1C}">
+                <a14:useLocalDpi xmlns:a14="http://schemas.microsoft.com/office/drawing/2010/main" val="0"/>
+              </a:ext>
+            </a:extLst>
+          </a:blip>
+          <a:srcRect/>
+          <a:stretch>
+            <a:fillRect/>
+          </a:stretch>
+        </p:blipFill>
+        <p:spPr bwMode="auto">
+          <a:xfrm>
+            <a:off x="4791134" y="3679881"/>
+            <a:ext cx="3848334" cy="2678515"/>
+          </a:xfrm>
+          <a:prstGeom prst="rect">
+            <a:avLst/>
+          </a:prstGeom>
+          <a:noFill/>
+          <a:extLst>
+            <a:ext uri="{909E8E84-426E-40DD-AFC4-6F175D3DCCD1}">
+              <a14:hiddenFill xmlns:a14="http://schemas.microsoft.com/office/drawing/2010/main">
+                <a:solidFill>
+                  <a:srgbClr val="FFFFFF"/>
+                </a:solidFill>
+              </a14:hiddenFill>
+            </a:ext>
+          </a:extLst>
+        </p:spPr>
+      </p:pic>
+      <p:pic>
+        <p:nvPicPr>
+          <p:cNvPr id="3076" name="Picture 4">
+            <a:extLst>
+              <a:ext uri="{FF2B5EF4-FFF2-40B4-BE49-F238E27FC236}">
+                <a16:creationId xmlns:a16="http://schemas.microsoft.com/office/drawing/2014/main" id="{7E6F5F2E-8B81-0A65-E7C7-69A334807B0E}"/>
+              </a:ext>
+            </a:extLst>
+          </p:cNvPr>
+          <p:cNvPicPr>
+            <a:picLocks noChangeAspect="1" noChangeArrowheads="1"/>
+          </p:cNvPicPr>
+          <p:nvPr/>
+        </p:nvPicPr>
+        <p:blipFill>
+          <a:blip r:embed="rId4">
+            <a:extLst>
+              <a:ext uri="{28A0092B-C50C-407E-A947-70E740481C1C}">
+                <a14:useLocalDpi xmlns:a14="http://schemas.microsoft.com/office/drawing/2010/main" val="0"/>
+              </a:ext>
+            </a:extLst>
+          </a:blip>
+          <a:srcRect/>
+          <a:stretch>
+            <a:fillRect/>
+          </a:stretch>
+        </p:blipFill>
+        <p:spPr bwMode="auto">
+          <a:xfrm>
+            <a:off x="8892914" y="2239121"/>
+            <a:ext cx="2771653" cy="2881520"/>
+          </a:xfrm>
+          <a:prstGeom prst="rect">
+            <a:avLst/>
+          </a:prstGeom>
+          <a:noFill/>
+          <a:extLst>
+            <a:ext uri="{909E8E84-426E-40DD-AFC4-6F175D3DCCD1}">
+              <a14:hiddenFill xmlns:a14="http://schemas.microsoft.com/office/drawing/2010/main">
+                <a:solidFill>
+                  <a:srgbClr val="FFFFFF"/>
+                </a:solidFill>
+              </a14:hiddenFill>
+            </a:ext>
+          </a:extLst>
+        </p:spPr>
+      </p:pic>
+      <p:sp>
+        <p:nvSpPr>
+          <p:cNvPr id="5" name="תיבת טקסט 4">
+            <a:extLst>
+              <a:ext uri="{FF2B5EF4-FFF2-40B4-BE49-F238E27FC236}">
+                <a16:creationId xmlns:a16="http://schemas.microsoft.com/office/drawing/2014/main" id="{AEA9DEDA-305D-62C3-DE11-0924C4C24420}"/>
+              </a:ext>
+            </a:extLst>
+          </p:cNvPr>
+          <p:cNvSpPr txBox="1"/>
+          <p:nvPr/>
+        </p:nvSpPr>
+        <p:spPr>
+          <a:xfrm>
+            <a:off x="361710" y="2017005"/>
+            <a:ext cx="9002210" cy="1938992"/>
+          </a:xfrm>
+          <a:prstGeom prst="rect">
+            <a:avLst/>
+          </a:prstGeom>
+          <a:noFill/>
+        </p:spPr>
+        <p:txBody>
+          <a:bodyPr wrap="square">
+            <a:spAutoFit/>
+          </a:bodyPr>
+          <a:lstStyle/>
+          <a:p>
+            <a:pPr marL="457200" indent="-457200" algn="l" rtl="0">
+              <a:buFont typeface="Arial" panose="020B0604020202020204" pitchFamily="34" charset="0"/>
+              <a:buChar char="•"/>
+            </a:pPr>
+            <a:r>
+              <a:rPr lang="en-US" sz="2400" dirty="0"/>
+              <a:t>Two decision points:</a:t>
+            </a:r>
+          </a:p>
+          <a:p>
+            <a:pPr marL="742950" lvl="1" indent="-285750" algn="l" rtl="0">
+              <a:buFont typeface="Arial" panose="020B0604020202020204" pitchFamily="34" charset="0"/>
+              <a:buChar char="•"/>
+            </a:pPr>
+            <a:r>
+              <a:rPr lang="en-US" sz="2400" dirty="0"/>
+              <a:t>After CRP</a:t>
+            </a:r>
+          </a:p>
+          <a:p>
+            <a:pPr marL="742950" lvl="1" indent="-285750" algn="l" rtl="0">
+              <a:buFont typeface="Arial" panose="020B0604020202020204" pitchFamily="34" charset="0"/>
+              <a:buChar char="•"/>
+            </a:pPr>
+            <a:r>
+              <a:rPr lang="en-US" sz="2400" dirty="0"/>
+              <a:t>After Leucocytes</a:t>
+            </a:r>
           </a:p>
           <a:p>
             <a:pPr marL="285750" indent="-285750" algn="l" rtl="0">
               <a:buFont typeface="Arial" panose="020B0604020202020204" pitchFamily="34" charset="0"/>
               <a:buChar char="•"/>
             </a:pPr>
-            <a:endParaRPr lang="en-US" sz="3200" dirty="0"/>
-          </a:p>
-          <a:p>
-            <a:pPr marL="285750" indent="-285750" algn="l" rtl="0">
+            <a:r>
+              <a:rPr lang="en-US" sz="2400" dirty="0"/>
+              <a:t>Impure leaves observed, Possible implications:</a:t>
+            </a:r>
+          </a:p>
+          <a:p>
+            <a:pPr marL="742950" lvl="1" indent="-285750" algn="l" rtl="0">
               <a:buFont typeface="Arial" panose="020B0604020202020204" pitchFamily="34" charset="0"/>
               <a:buChar char="•"/>
             </a:pPr>
             <a:r>
-              <a:rPr lang="en-US" sz="3200" dirty="0"/>
-              <a:t>20 most common traces:</a:t>
-            </a:r>
+              <a:rPr lang="en-US" sz="2400"/>
+              <a:t>Complex decision</a:t>
+            </a:r>
+            <a:endParaRPr lang="en-US" sz="2400" dirty="0"/>
           </a:p>
         </p:txBody>
       </p:sp>
     </p:spTree>
     <p:extLst>
       <p:ext uri="{BB962C8B-B14F-4D97-AF65-F5344CB8AC3E}">
-        <p14:creationId xmlns:p14="http://schemas.microsoft.com/office/powerpoint/2010/main" val="3392102478"/>
+        <p14:creationId xmlns:p14="http://schemas.microsoft.com/office/powerpoint/2010/main" val="1855094519"/>
       </p:ext>
     </p:extLst>
   </p:cSld>
@@ -8138,7 +9234,7 @@
             </a:pPr>
             <a:r>
               <a:rPr lang="en-US" sz="3200" dirty="0"/>
-              <a:t>20 most common traces:</a:t>
+              <a:t>3 most common traces:</a:t>
             </a:r>
           </a:p>
           <a:p>
@@ -8149,10 +9245,10 @@
       </p:sp>
       <p:pic>
         <p:nvPicPr>
-          <p:cNvPr id="6" name="תמונה 5">
+          <p:cNvPr id="4" name="תמונה 3">
             <a:extLst>
               <a:ext uri="{FF2B5EF4-FFF2-40B4-BE49-F238E27FC236}">
-                <a16:creationId xmlns:a16="http://schemas.microsoft.com/office/drawing/2014/main" id="{77A04AD9-7A27-21EF-CC95-F9A40FC8372F}"/>
+                <a16:creationId xmlns:a16="http://schemas.microsoft.com/office/drawing/2014/main" id="{4B1B6B1F-C9B9-CF92-ED5F-605CAA2DB64F}"/>
               </a:ext>
             </a:extLst>
           </p:cNvPr>
@@ -8162,14 +9258,20 @@
           <p:nvPr/>
         </p:nvPicPr>
         <p:blipFill>
-          <a:blip r:embed="rId3"/>
+          <a:blip r:embed="rId3">
+            <a:extLst>
+              <a:ext uri="{28A0092B-C50C-407E-A947-70E740481C1C}">
+                <a14:useLocalDpi xmlns:a14="http://schemas.microsoft.com/office/drawing/2010/main" val="0"/>
+              </a:ext>
+            </a:extLst>
+          </a:blip>
           <a:stretch>
             <a:fillRect/>
           </a:stretch>
         </p:blipFill>
         <p:spPr>
           <a:xfrm>
-            <a:off x="0" y="2766555"/>
+            <a:off x="0" y="2793449"/>
             <a:ext cx="12192000" cy="581763"/>
           </a:xfrm>
           <a:prstGeom prst="rect">
@@ -8179,10 +9281,10 @@
       </p:pic>
       <p:pic>
         <p:nvPicPr>
-          <p:cNvPr id="8" name="תמונה 7">
+          <p:cNvPr id="9" name="תמונה 8" descr="תמונה שמכילה תרשים, קו, לבן, גופן&#10;&#10;התיאור נוצר באופן אוטומטי">
             <a:extLst>
               <a:ext uri="{FF2B5EF4-FFF2-40B4-BE49-F238E27FC236}">
-                <a16:creationId xmlns:a16="http://schemas.microsoft.com/office/drawing/2014/main" id="{3346BF60-F6C0-357B-DB55-8B4B889C1E4A}"/>
+                <a16:creationId xmlns:a16="http://schemas.microsoft.com/office/drawing/2014/main" id="{7D71D585-0A65-DE9C-379E-0D83F2349908}"/>
               </a:ext>
             </a:extLst>
           </p:cNvPr>
@@ -8192,15 +9294,21 @@
           <p:nvPr/>
         </p:nvPicPr>
         <p:blipFill>
-          <a:blip r:embed="rId4"/>
+          <a:blip r:embed="rId4">
+            <a:extLst>
+              <a:ext uri="{28A0092B-C50C-407E-A947-70E740481C1C}">
+                <a14:useLocalDpi xmlns:a14="http://schemas.microsoft.com/office/drawing/2010/main" val="0"/>
+              </a:ext>
+            </a:extLst>
+          </a:blip>
           <a:stretch>
             <a:fillRect/>
           </a:stretch>
         </p:blipFill>
         <p:spPr>
           <a:xfrm>
-            <a:off x="0" y="4084133"/>
-            <a:ext cx="12192000" cy="2590562"/>
+            <a:off x="0" y="4173606"/>
+            <a:ext cx="12192000" cy="2207172"/>
           </a:xfrm>
           <a:prstGeom prst="rect">
             <a:avLst/>

</xml_diff>